<commit_message>
Project: Eclipse .project file
</commit_message>
<xml_diff>
--- a/docs/Kubernetes-Autoscaling-on-AWS.pptx
+++ b/docs/Kubernetes-Autoscaling-on-AWS.pptx
@@ -207,7 +207,7 @@
             <a:fld id="{814910AB-AEF0-414C-82CB-791080B1186B}" type="datetimeFigureOut">
               <a:rPr lang="en-US" smtClean="0"/>
               <a:pPr/>
-              <a:t>11/28/2016</a:t>
+              <a:t>9/2/2017</a:t>
             </a:fld>
             <a:endParaRPr lang="en-US" dirty="0"/>
           </a:p>
@@ -281,6 +281,11 @@
         </p:txBody>
       </p:sp>
     </p:spTree>
+    <p:extLst>
+      <p:ext uri="{BB962C8B-B14F-4D97-AF65-F5344CB8AC3E}">
+        <p14:creationId xmlns:p14="http://schemas.microsoft.com/office/powerpoint/2010/main" val="3210234941"/>
+      </p:ext>
+    </p:extLst>
   </p:cSld>
   <p:clrMap bg1="lt1" tx1="dk1" bg2="lt2" tx2="dk2" accent1="accent1" accent2="accent2" accent3="accent3" accent4="accent4" accent5="accent5" accent6="accent6" hlink="hlink" folHlink="folHlink"/>
 </p:handoutMaster>
@@ -369,7 +374,7 @@
             <a:fld id="{5B4AE38D-E020-46F3-803D-8636C5B7B74E}" type="datetimeFigureOut">
               <a:rPr lang="en-US" smtClean="0"/>
               <a:pPr/>
-              <a:t>11/28/2016</a:t>
+              <a:t>9/2/2017</a:t>
             </a:fld>
             <a:endParaRPr lang="en-US" dirty="0"/>
           </a:p>
@@ -538,6 +543,11 @@
         </p:txBody>
       </p:sp>
     </p:spTree>
+    <p:extLst>
+      <p:ext uri="{BB962C8B-B14F-4D97-AF65-F5344CB8AC3E}">
+        <p14:creationId xmlns:p14="http://schemas.microsoft.com/office/powerpoint/2010/main" val="158610958"/>
+      </p:ext>
+    </p:extLst>
   </p:cSld>
   <p:clrMap bg1="lt1" tx1="dk1" bg2="lt2" tx2="dk2" accent1="accent1" accent2="accent2" accent3="accent3" accent4="accent4" accent5="accent5" accent6="accent6" hlink="hlink" folHlink="folHlink"/>
   <p:notesStyle>
@@ -942,7 +952,7 @@
             <a:fld id="{7DDB771E-4AED-4DD3-8AA1-5D9FD2224F14}" type="datetimeFigureOut">
               <a:rPr lang="en-US" smtClean="0"/>
               <a:pPr/>
-              <a:t>11/28/2016</a:t>
+              <a:t>9/2/2017</a:t>
             </a:fld>
             <a:endParaRPr lang="en-US" dirty="0"/>
           </a:p>
@@ -1109,7 +1119,7 @@
             <a:fld id="{7DDB771E-4AED-4DD3-8AA1-5D9FD2224F14}" type="datetimeFigureOut">
               <a:rPr lang="en-US" smtClean="0"/>
               <a:pPr/>
-              <a:t>11/28/2016</a:t>
+              <a:t>9/2/2017</a:t>
             </a:fld>
             <a:endParaRPr lang="en-US" dirty="0"/>
           </a:p>
@@ -1286,7 +1296,7 @@
             <a:fld id="{7DDB771E-4AED-4DD3-8AA1-5D9FD2224F14}" type="datetimeFigureOut">
               <a:rPr lang="en-US" smtClean="0"/>
               <a:pPr/>
-              <a:t>11/28/2016</a:t>
+              <a:t>9/2/2017</a:t>
             </a:fld>
             <a:endParaRPr lang="en-US" dirty="0"/>
           </a:p>
@@ -1453,7 +1463,7 @@
             <a:fld id="{7DDB771E-4AED-4DD3-8AA1-5D9FD2224F14}" type="datetimeFigureOut">
               <a:rPr lang="en-US" smtClean="0"/>
               <a:pPr/>
-              <a:t>11/28/2016</a:t>
+              <a:t>9/2/2017</a:t>
             </a:fld>
             <a:endParaRPr lang="en-US" dirty="0"/>
           </a:p>
@@ -1696,7 +1706,7 @@
             <a:fld id="{7DDB771E-4AED-4DD3-8AA1-5D9FD2224F14}" type="datetimeFigureOut">
               <a:rPr lang="en-US" smtClean="0"/>
               <a:pPr/>
-              <a:t>11/28/2016</a:t>
+              <a:t>9/2/2017</a:t>
             </a:fld>
             <a:endParaRPr lang="en-US" dirty="0"/>
           </a:p>
@@ -1981,7 +1991,7 @@
             <a:fld id="{7DDB771E-4AED-4DD3-8AA1-5D9FD2224F14}" type="datetimeFigureOut">
               <a:rPr lang="en-US" smtClean="0"/>
               <a:pPr/>
-              <a:t>11/28/2016</a:t>
+              <a:t>9/2/2017</a:t>
             </a:fld>
             <a:endParaRPr lang="en-US" dirty="0"/>
           </a:p>
@@ -2400,7 +2410,7 @@
             <a:fld id="{7DDB771E-4AED-4DD3-8AA1-5D9FD2224F14}" type="datetimeFigureOut">
               <a:rPr lang="en-US" smtClean="0"/>
               <a:pPr/>
-              <a:t>11/28/2016</a:t>
+              <a:t>9/2/2017</a:t>
             </a:fld>
             <a:endParaRPr lang="en-US" dirty="0"/>
           </a:p>
@@ -2515,7 +2525,7 @@
             <a:fld id="{7DDB771E-4AED-4DD3-8AA1-5D9FD2224F14}" type="datetimeFigureOut">
               <a:rPr lang="en-US" smtClean="0"/>
               <a:pPr/>
-              <a:t>11/28/2016</a:t>
+              <a:t>9/2/2017</a:t>
             </a:fld>
             <a:endParaRPr lang="en-US" dirty="0"/>
           </a:p>
@@ -2607,7 +2617,7 @@
             <a:fld id="{7DDB771E-4AED-4DD3-8AA1-5D9FD2224F14}" type="datetimeFigureOut">
               <a:rPr lang="en-US" smtClean="0"/>
               <a:pPr/>
-              <a:t>11/28/2016</a:t>
+              <a:t>9/2/2017</a:t>
             </a:fld>
             <a:endParaRPr lang="en-US" dirty="0"/>
           </a:p>
@@ -2881,7 +2891,7 @@
             <a:fld id="{7DDB771E-4AED-4DD3-8AA1-5D9FD2224F14}" type="datetimeFigureOut">
               <a:rPr lang="en-US" smtClean="0"/>
               <a:pPr/>
-              <a:t>11/28/2016</a:t>
+              <a:t>9/2/2017</a:t>
             </a:fld>
             <a:endParaRPr lang="en-US" dirty="0"/>
           </a:p>
@@ -3131,7 +3141,7 @@
             <a:fld id="{7DDB771E-4AED-4DD3-8AA1-5D9FD2224F14}" type="datetimeFigureOut">
               <a:rPr lang="en-US" smtClean="0"/>
               <a:pPr/>
-              <a:t>11/28/2016</a:t>
+              <a:t>9/2/2017</a:t>
             </a:fld>
             <a:endParaRPr lang="en-US" dirty="0"/>
           </a:p>
@@ -3341,7 +3351,7 @@
             <a:fld id="{7DDB771E-4AED-4DD3-8AA1-5D9FD2224F14}" type="datetimeFigureOut">
               <a:rPr lang="en-US" smtClean="0"/>
               <a:pPr/>
-              <a:t>11/28/2016</a:t>
+              <a:t>9/2/2017</a:t>
             </a:fld>
             <a:endParaRPr lang="en-US" dirty="0"/>
           </a:p>
@@ -3737,23 +3747,23 @@
             <a:pPr algn="ctr"/>
             <a:r>
               <a:rPr lang="en-US" dirty="0" smtClean="0"/>
+              <a:t>Kirk S. Kalvar</a:t>
+            </a:r>
+          </a:p>
+          <a:p>
+            <a:pPr algn="ctr"/>
+            <a:r>
+              <a:rPr lang="en-US" dirty="0" smtClean="0"/>
+              <a:t>Senior Software Engineer</a:t>
+            </a:r>
+            <a:endParaRPr lang="en-US" dirty="0" smtClean="0"/>
+          </a:p>
+          <a:p>
+            <a:pPr algn="ctr"/>
+            <a:r>
+              <a:rPr lang="en-US" dirty="0" smtClean="0"/>
               <a:t>kirk.kalvar@kal.technology</a:t>
             </a:r>
-          </a:p>
-          <a:p>
-            <a:pPr algn="ctr"/>
-            <a:r>
-              <a:rPr lang="en-US" dirty="0" smtClean="0"/>
-              <a:t>@kskalvar</a:t>
-            </a:r>
-          </a:p>
-          <a:p>
-            <a:pPr algn="ctr"/>
-            <a:r>
-              <a:rPr lang="en-US" dirty="0" smtClean="0"/>
-              <a:t>(cell) 703-628-7677</a:t>
-            </a:r>
-            <a:endParaRPr lang="en-US" dirty="0"/>
           </a:p>
         </p:txBody>
       </p:sp>
@@ -3827,23 +3837,7 @@
                 <a:ea typeface="+mj-ea"/>
                 <a:cs typeface="+mj-cs"/>
               </a:rPr>
-              <a:t>Kubernetes </a:t>
-            </a:r>
-            <a:r>
-              <a:rPr lang="en-US" sz="4400" dirty="0" smtClean="0">
-                <a:latin typeface="+mj-lt"/>
-                <a:ea typeface="+mj-ea"/>
-                <a:cs typeface="+mj-cs"/>
-              </a:rPr>
-              <a:t>Autoscaling </a:t>
-            </a:r>
-            <a:r>
-              <a:rPr lang="en-US" sz="4400" dirty="0" smtClean="0">
-                <a:latin typeface="+mj-lt"/>
-                <a:ea typeface="+mj-ea"/>
-                <a:cs typeface="+mj-cs"/>
-              </a:rPr>
-              <a:t>on AWS</a:t>
+              <a:t>Kubernetes Autoscaling on AWS</a:t>
             </a:r>
             <a:endParaRPr kumimoji="0" lang="en-US" sz="4400" b="0" i="0" u="none" strike="noStrike" kern="1200" cap="none" spc="0" normalizeH="0" baseline="0" noProof="0" dirty="0">
               <a:ln>
@@ -4227,8 +4221,13 @@
             </a:pPr>
             <a:r>
               <a:rPr lang="en-US" dirty="0" smtClean="0"/>
-              <a:t> github.com/kskalvar/kubernetes-autoscaling-aws</a:t>
-            </a:r>
+              <a:t> </a:t>
+            </a:r>
+            <a:r>
+              <a:rPr lang="en-US" dirty="0" smtClean="0"/>
+              <a:t>github.com/kskalvar/kubernetes-aws-autoscaling</a:t>
+            </a:r>
+            <a:endParaRPr lang="en-US" dirty="0" smtClean="0"/>
           </a:p>
         </p:txBody>
       </p:sp>
@@ -4356,8 +4355,13 @@
             </a:pPr>
             <a:r>
               <a:rPr lang="en-US" dirty="0" smtClean="0"/>
-              <a:t>  Focused on Open Source</a:t>
-            </a:r>
+              <a:t>  Focused on Open </a:t>
+            </a:r>
+            <a:r>
+              <a:rPr lang="en-US" dirty="0" smtClean="0"/>
+              <a:t>Source Solutions</a:t>
+            </a:r>
+            <a:endParaRPr lang="en-US" dirty="0" smtClean="0"/>
           </a:p>
           <a:p>
             <a:pPr>

</xml_diff>

<commit_message>
Upgraded to use Kubernetes 1.7.6 using Kops
</commit_message>
<xml_diff>
--- a/docs/Kubernetes-Autoscaling-on-AWS.pptx
+++ b/docs/Kubernetes-Autoscaling-on-AWS.pptx
@@ -207,7 +207,7 @@
             <a:fld id="{814910AB-AEF0-414C-82CB-791080B1186B}" type="datetimeFigureOut">
               <a:rPr lang="en-US" smtClean="0"/>
               <a:pPr/>
-              <a:t>9/2/2017</a:t>
+              <a:t>10/6/2017</a:t>
             </a:fld>
             <a:endParaRPr lang="en-US" dirty="0"/>
           </a:p>
@@ -374,7 +374,7 @@
             <a:fld id="{5B4AE38D-E020-46F3-803D-8636C5B7B74E}" type="datetimeFigureOut">
               <a:rPr lang="en-US" smtClean="0"/>
               <a:pPr/>
-              <a:t>9/2/2017</a:t>
+              <a:t>10/6/2017</a:t>
             </a:fld>
             <a:endParaRPr lang="en-US" dirty="0"/>
           </a:p>
@@ -952,7 +952,7 @@
             <a:fld id="{7DDB771E-4AED-4DD3-8AA1-5D9FD2224F14}" type="datetimeFigureOut">
               <a:rPr lang="en-US" smtClean="0"/>
               <a:pPr/>
-              <a:t>9/2/2017</a:t>
+              <a:t>10/6/2017</a:t>
             </a:fld>
             <a:endParaRPr lang="en-US" dirty="0"/>
           </a:p>
@@ -1119,7 +1119,7 @@
             <a:fld id="{7DDB771E-4AED-4DD3-8AA1-5D9FD2224F14}" type="datetimeFigureOut">
               <a:rPr lang="en-US" smtClean="0"/>
               <a:pPr/>
-              <a:t>9/2/2017</a:t>
+              <a:t>10/6/2017</a:t>
             </a:fld>
             <a:endParaRPr lang="en-US" dirty="0"/>
           </a:p>
@@ -1296,7 +1296,7 @@
             <a:fld id="{7DDB771E-4AED-4DD3-8AA1-5D9FD2224F14}" type="datetimeFigureOut">
               <a:rPr lang="en-US" smtClean="0"/>
               <a:pPr/>
-              <a:t>9/2/2017</a:t>
+              <a:t>10/6/2017</a:t>
             </a:fld>
             <a:endParaRPr lang="en-US" dirty="0"/>
           </a:p>
@@ -1463,7 +1463,7 @@
             <a:fld id="{7DDB771E-4AED-4DD3-8AA1-5D9FD2224F14}" type="datetimeFigureOut">
               <a:rPr lang="en-US" smtClean="0"/>
               <a:pPr/>
-              <a:t>9/2/2017</a:t>
+              <a:t>10/6/2017</a:t>
             </a:fld>
             <a:endParaRPr lang="en-US" dirty="0"/>
           </a:p>
@@ -1706,7 +1706,7 @@
             <a:fld id="{7DDB771E-4AED-4DD3-8AA1-5D9FD2224F14}" type="datetimeFigureOut">
               <a:rPr lang="en-US" smtClean="0"/>
               <a:pPr/>
-              <a:t>9/2/2017</a:t>
+              <a:t>10/6/2017</a:t>
             </a:fld>
             <a:endParaRPr lang="en-US" dirty="0"/>
           </a:p>
@@ -1991,7 +1991,7 @@
             <a:fld id="{7DDB771E-4AED-4DD3-8AA1-5D9FD2224F14}" type="datetimeFigureOut">
               <a:rPr lang="en-US" smtClean="0"/>
               <a:pPr/>
-              <a:t>9/2/2017</a:t>
+              <a:t>10/6/2017</a:t>
             </a:fld>
             <a:endParaRPr lang="en-US" dirty="0"/>
           </a:p>
@@ -2410,7 +2410,7 @@
             <a:fld id="{7DDB771E-4AED-4DD3-8AA1-5D9FD2224F14}" type="datetimeFigureOut">
               <a:rPr lang="en-US" smtClean="0"/>
               <a:pPr/>
-              <a:t>9/2/2017</a:t>
+              <a:t>10/6/2017</a:t>
             </a:fld>
             <a:endParaRPr lang="en-US" dirty="0"/>
           </a:p>
@@ -2525,7 +2525,7 @@
             <a:fld id="{7DDB771E-4AED-4DD3-8AA1-5D9FD2224F14}" type="datetimeFigureOut">
               <a:rPr lang="en-US" smtClean="0"/>
               <a:pPr/>
-              <a:t>9/2/2017</a:t>
+              <a:t>10/6/2017</a:t>
             </a:fld>
             <a:endParaRPr lang="en-US" dirty="0"/>
           </a:p>
@@ -2617,7 +2617,7 @@
             <a:fld id="{7DDB771E-4AED-4DD3-8AA1-5D9FD2224F14}" type="datetimeFigureOut">
               <a:rPr lang="en-US" smtClean="0"/>
               <a:pPr/>
-              <a:t>9/2/2017</a:t>
+              <a:t>10/6/2017</a:t>
             </a:fld>
             <a:endParaRPr lang="en-US" dirty="0"/>
           </a:p>
@@ -2891,7 +2891,7 @@
             <a:fld id="{7DDB771E-4AED-4DD3-8AA1-5D9FD2224F14}" type="datetimeFigureOut">
               <a:rPr lang="en-US" smtClean="0"/>
               <a:pPr/>
-              <a:t>9/2/2017</a:t>
+              <a:t>10/6/2017</a:t>
             </a:fld>
             <a:endParaRPr lang="en-US" dirty="0"/>
           </a:p>
@@ -3141,7 +3141,7 @@
             <a:fld id="{7DDB771E-4AED-4DD3-8AA1-5D9FD2224F14}" type="datetimeFigureOut">
               <a:rPr lang="en-US" smtClean="0"/>
               <a:pPr/>
-              <a:t>9/2/2017</a:t>
+              <a:t>10/6/2017</a:t>
             </a:fld>
             <a:endParaRPr lang="en-US" dirty="0"/>
           </a:p>
@@ -3351,7 +3351,7 @@
             <a:fld id="{7DDB771E-4AED-4DD3-8AA1-5D9FD2224F14}" type="datetimeFigureOut">
               <a:rPr lang="en-US" smtClean="0"/>
               <a:pPr/>
-              <a:t>9/2/2017</a:t>
+              <a:t>10/6/2017</a:t>
             </a:fld>
             <a:endParaRPr lang="en-US" dirty="0"/>
           </a:p>
@@ -3730,8 +3730,8 @@
         </p:nvSpPr>
         <p:spPr>
           <a:xfrm>
-            <a:off x="3092723" y="3828874"/>
-            <a:ext cx="2703432" cy="923330"/>
+            <a:off x="3061272" y="3828874"/>
+            <a:ext cx="2766335" cy="923330"/>
           </a:xfrm>
           <a:prstGeom prst="rect">
             <a:avLst/>
@@ -3756,7 +3756,6 @@
               <a:rPr lang="en-US" dirty="0" smtClean="0"/>
               <a:t>Senior Software Engineer</a:t>
             </a:r>
-            <a:endParaRPr lang="en-US" dirty="0" smtClean="0"/>
           </a:p>
           <a:p>
             <a:pPr algn="ctr"/>
@@ -4221,13 +4220,8 @@
             </a:pPr>
             <a:r>
               <a:rPr lang="en-US" dirty="0" smtClean="0"/>
-              <a:t> </a:t>
-            </a:r>
-            <a:r>
-              <a:rPr lang="en-US" dirty="0" smtClean="0"/>
-              <a:t>github.com/kskalvar/kubernetes-aws-autoscaling</a:t>
-            </a:r>
-            <a:endParaRPr lang="en-US" dirty="0" smtClean="0"/>
+              <a:t> github.com/kskalvar/kubernetes-aws-autoscaling</a:t>
+            </a:r>
           </a:p>
         </p:txBody>
       </p:sp>
@@ -4345,7 +4339,7 @@
             </a:pPr>
             <a:r>
               <a:rPr lang="en-US" dirty="0" smtClean="0"/>
-              <a:t>  Enterprise/Mobile/Infrastructure Developer</a:t>
+              <a:t>  Enterprise/Mobile/Embedded/IoT/Infrastructure</a:t>
             </a:r>
           </a:p>
           <a:p>
@@ -4355,13 +4349,8 @@
             </a:pPr>
             <a:r>
               <a:rPr lang="en-US" dirty="0" smtClean="0"/>
-              <a:t>  Focused on Open </a:t>
-            </a:r>
-            <a:r>
-              <a:rPr lang="en-US" dirty="0" smtClean="0"/>
-              <a:t>Source Solutions</a:t>
-            </a:r>
-            <a:endParaRPr lang="en-US" dirty="0" smtClean="0"/>
+              <a:t>  Focused on Open Source Solutions</a:t>
+            </a:r>
           </a:p>
           <a:p>
             <a:pPr>
@@ -4685,16 +4674,68 @@
           <a:chExt cx="0" cy="0"/>
         </a:xfrm>
       </p:grpSpPr>
-      <p:sp>
-        <p:nvSpPr>
-          <p:cNvPr id="80" name="Rectangle 79"/>
+      <p:pic>
+        <p:nvPicPr>
+          <p:cNvPr id="83" name="Picture 82" descr="KAL-Logo.png"/>
+          <p:cNvPicPr>
+            <a:picLocks noChangeAspect="1"/>
+          </p:cNvPicPr>
+          <p:nvPr/>
+        </p:nvPicPr>
+        <p:blipFill>
+          <a:blip r:embed="rId2" cstate="print"/>
+          <a:stretch>
+            <a:fillRect/>
+          </a:stretch>
+        </p:blipFill>
+        <p:spPr>
+          <a:xfrm>
+            <a:off x="7848600" y="152400"/>
+            <a:ext cx="1143160" cy="762106"/>
+          </a:xfrm>
+          <a:prstGeom prst="rect">
+            <a:avLst/>
+          </a:prstGeom>
+        </p:spPr>
+      </p:pic>
+      <p:sp>
+        <p:nvSpPr>
+          <p:cNvPr id="89" name="Title 1"/>
+          <p:cNvSpPr>
+            <a:spLocks noGrp="1"/>
+          </p:cNvSpPr>
+          <p:nvPr>
+            <p:ph type="title"/>
+          </p:nvPr>
+        </p:nvSpPr>
+        <p:spPr>
+          <a:xfrm>
+            <a:off x="482367" y="283027"/>
+            <a:ext cx="8229600" cy="867347"/>
+          </a:xfrm>
+        </p:spPr>
+        <p:txBody>
+          <a:bodyPr/>
+          <a:lstStyle/>
+          <a:p>
+            <a:r>
+              <a:rPr lang="en-US" dirty="0" smtClean="0"/>
+              <a:t>Demo Architecture</a:t>
+            </a:r>
+            <a:endParaRPr lang="en-US" dirty="0"/>
+          </a:p>
+        </p:txBody>
+      </p:sp>
+      <p:sp>
+        <p:nvSpPr>
+          <p:cNvPr id="31" name="Rectangle 30"/>
           <p:cNvSpPr/>
           <p:nvPr/>
         </p:nvSpPr>
         <p:spPr>
           <a:xfrm>
-            <a:off x="201336" y="1510451"/>
-            <a:ext cx="8581937" cy="4114612"/>
+            <a:off x="201336" y="1883176"/>
+            <a:ext cx="8581937" cy="3833739"/>
           </a:xfrm>
           <a:prstGeom prst="rect">
             <a:avLst/>
@@ -4727,56 +4768,13 @@
       </p:sp>
       <p:sp>
         <p:nvSpPr>
-          <p:cNvPr id="81" name="Rectangle 80"/>
+          <p:cNvPr id="32" name="Rectangle 31"/>
           <p:cNvSpPr/>
           <p:nvPr/>
         </p:nvSpPr>
         <p:spPr>
           <a:xfrm>
-            <a:off x="2195051" y="2145943"/>
-            <a:ext cx="5561704" cy="2702285"/>
-          </a:xfrm>
-          <a:prstGeom prst="rect">
-            <a:avLst/>
-          </a:prstGeom>
-          <a:solidFill>
-            <a:schemeClr val="bg2"/>
-          </a:solidFill>
-        </p:spPr>
-        <p:style>
-          <a:lnRef idx="2">
-            <a:schemeClr val="accent1">
-              <a:shade val="50000"/>
-            </a:schemeClr>
-          </a:lnRef>
-          <a:fillRef idx="1">
-            <a:schemeClr val="accent1"/>
-          </a:fillRef>
-          <a:effectRef idx="0">
-            <a:schemeClr val="accent1"/>
-          </a:effectRef>
-          <a:fontRef idx="minor">
-            <a:schemeClr val="lt1"/>
-          </a:fontRef>
-        </p:style>
-        <p:txBody>
-          <a:bodyPr rtlCol="0" anchor="ctr"/>
-          <a:lstStyle/>
-          <a:p>
-            <a:pPr algn="ctr"/>
-            <a:endParaRPr lang="en-US" dirty="0"/>
-          </a:p>
-        </p:txBody>
-      </p:sp>
-      <p:sp>
-        <p:nvSpPr>
-          <p:cNvPr id="82" name="Rectangle 81"/>
-          <p:cNvSpPr/>
-          <p:nvPr/>
-        </p:nvSpPr>
-        <p:spPr>
-          <a:xfrm>
-            <a:off x="545446" y="2761824"/>
+            <a:off x="545446" y="2853677"/>
             <a:ext cx="1295400" cy="1981200"/>
           </a:xfrm>
           <a:prstGeom prst="rect">
@@ -4824,7 +4822,7 @@
                   <a:schemeClr val="tx1"/>
                 </a:solidFill>
               </a:rPr>
-              <a:t>kubectl </a:t>
+              <a:t>kubectl</a:t>
             </a:r>
           </a:p>
           <a:p>
@@ -4835,7 +4833,18 @@
                   <a:schemeClr val="tx1"/>
                 </a:solidFill>
               </a:rPr>
-              <a:t>aws client </a:t>
+              <a:t>kops</a:t>
+            </a:r>
+          </a:p>
+          <a:p>
+            <a:pPr algn="ctr"/>
+            <a:r>
+              <a:rPr lang="en-US" dirty="0" smtClean="0">
+                <a:solidFill>
+                  <a:schemeClr val="tx1"/>
+                </a:solidFill>
+              </a:rPr>
+              <a:t>aws cli </a:t>
             </a:r>
             <a:endParaRPr lang="en-US" dirty="0">
               <a:solidFill>
@@ -4845,82 +4854,15 @@
           </a:p>
         </p:txBody>
       </p:sp>
-      <p:pic>
-        <p:nvPicPr>
-          <p:cNvPr id="83" name="Picture 82" descr="KAL-Logo.png"/>
-          <p:cNvPicPr>
-            <a:picLocks noChangeAspect="1"/>
-          </p:cNvPicPr>
+      <p:sp>
+        <p:nvSpPr>
+          <p:cNvPr id="33" name="TextBox 32"/>
+          <p:cNvSpPr txBox="1"/>
           <p:nvPr/>
-        </p:nvPicPr>
-        <p:blipFill>
-          <a:blip r:embed="rId2" cstate="print"/>
-          <a:stretch>
-            <a:fillRect/>
-          </a:stretch>
-        </p:blipFill>
+        </p:nvSpPr>
         <p:spPr>
           <a:xfrm>
-            <a:off x="7848600" y="152400"/>
-            <a:ext cx="1143160" cy="762106"/>
-          </a:xfrm>
-          <a:prstGeom prst="rect">
-            <a:avLst/>
-          </a:prstGeom>
-        </p:spPr>
-      </p:pic>
-      <p:sp>
-        <p:nvSpPr>
-          <p:cNvPr id="84" name="Rectangle 83"/>
-          <p:cNvSpPr/>
-          <p:nvPr/>
-        </p:nvSpPr>
-        <p:spPr>
-          <a:xfrm>
-            <a:off x="2501465" y="2753435"/>
-            <a:ext cx="1161759" cy="1981200"/>
-          </a:xfrm>
-          <a:prstGeom prst="rect">
-            <a:avLst/>
-          </a:prstGeom>
-          <a:solidFill>
-            <a:schemeClr val="bg1"/>
-          </a:solidFill>
-        </p:spPr>
-        <p:style>
-          <a:lnRef idx="2">
-            <a:schemeClr val="accent1">
-              <a:shade val="50000"/>
-            </a:schemeClr>
-          </a:lnRef>
-          <a:fillRef idx="1">
-            <a:schemeClr val="accent1"/>
-          </a:fillRef>
-          <a:effectRef idx="0">
-            <a:schemeClr val="accent1"/>
-          </a:effectRef>
-          <a:fontRef idx="minor">
-            <a:schemeClr val="lt1"/>
-          </a:fontRef>
-        </p:style>
-        <p:txBody>
-          <a:bodyPr rtlCol="0" anchor="ctr"/>
-          <a:lstStyle/>
-          <a:p>
-            <a:pPr algn="ctr"/>
-            <a:endParaRPr lang="en-US" dirty="0"/>
-          </a:p>
-        </p:txBody>
-      </p:sp>
-      <p:sp>
-        <p:nvSpPr>
-          <p:cNvPr id="85" name="TextBox 84"/>
-          <p:cNvSpPr txBox="1"/>
-          <p:nvPr/>
-        </p:nvSpPr>
-        <p:spPr>
-          <a:xfrm>
-            <a:off x="313269" y="2416471"/>
+            <a:off x="414864" y="2508324"/>
             <a:ext cx="1666162" cy="338554"/>
           </a:xfrm>
           <a:prstGeom prst="rect">
@@ -4944,277 +4886,13 @@
       </p:sp>
       <p:sp>
         <p:nvSpPr>
-          <p:cNvPr id="86" name="TextBox 85"/>
+          <p:cNvPr id="34" name="TextBox 33"/>
           <p:cNvSpPr txBox="1"/>
           <p:nvPr/>
         </p:nvSpPr>
         <p:spPr>
           <a:xfrm>
-            <a:off x="2448451" y="2416471"/>
-            <a:ext cx="1218347" cy="369332"/>
-          </a:xfrm>
-          <a:prstGeom prst="rect">
-            <a:avLst/>
-          </a:prstGeom>
-          <a:noFill/>
-        </p:spPr>
-        <p:txBody>
-          <a:bodyPr wrap="none" rtlCol="0">
-            <a:spAutoFit/>
-          </a:bodyPr>
-          <a:lstStyle/>
-          <a:p>
-            <a:r>
-              <a:rPr lang="en-US" dirty="0" smtClean="0"/>
-              <a:t>k8s-master</a:t>
-            </a:r>
-            <a:endParaRPr lang="en-US" dirty="0"/>
-          </a:p>
-        </p:txBody>
-      </p:sp>
-      <p:sp>
-        <p:nvSpPr>
-          <p:cNvPr id="87" name="Rectangle 86"/>
-          <p:cNvSpPr/>
-          <p:nvPr/>
-        </p:nvSpPr>
-        <p:spPr>
-          <a:xfrm>
-            <a:off x="6228314" y="2753435"/>
-            <a:ext cx="1295400" cy="1981200"/>
-          </a:xfrm>
-          <a:prstGeom prst="rect">
-            <a:avLst/>
-          </a:prstGeom>
-          <a:solidFill>
-            <a:schemeClr val="bg1"/>
-          </a:solidFill>
-        </p:spPr>
-        <p:style>
-          <a:lnRef idx="2">
-            <a:schemeClr val="accent1">
-              <a:shade val="50000"/>
-            </a:schemeClr>
-          </a:lnRef>
-          <a:fillRef idx="1">
-            <a:schemeClr val="accent1"/>
-          </a:fillRef>
-          <a:effectRef idx="0">
-            <a:schemeClr val="accent1"/>
-          </a:effectRef>
-          <a:fontRef idx="minor">
-            <a:schemeClr val="lt1"/>
-          </a:fontRef>
-        </p:style>
-        <p:txBody>
-          <a:bodyPr rtlCol="0" anchor="ctr"/>
-          <a:lstStyle/>
-          <a:p>
-            <a:pPr algn="ctr"/>
-            <a:endParaRPr lang="en-US" dirty="0"/>
-          </a:p>
-        </p:txBody>
-      </p:sp>
-      <p:sp>
-        <p:nvSpPr>
-          <p:cNvPr id="88" name="TextBox 87"/>
-          <p:cNvSpPr txBox="1"/>
-          <p:nvPr/>
-        </p:nvSpPr>
-        <p:spPr>
-          <a:xfrm>
-            <a:off x="6228314" y="2416471"/>
-            <a:ext cx="1221809" cy="369332"/>
-          </a:xfrm>
-          <a:prstGeom prst="rect">
-            <a:avLst/>
-          </a:prstGeom>
-          <a:noFill/>
-        </p:spPr>
-        <p:txBody>
-          <a:bodyPr wrap="none" rtlCol="0">
-            <a:spAutoFit/>
-          </a:bodyPr>
-          <a:lstStyle/>
-          <a:p>
-            <a:r>
-              <a:rPr lang="en-US" dirty="0" smtClean="0"/>
-              <a:t>k8s-minion</a:t>
-            </a:r>
-            <a:endParaRPr lang="en-US" dirty="0"/>
-          </a:p>
-        </p:txBody>
-      </p:sp>
-      <p:sp>
-        <p:nvSpPr>
-          <p:cNvPr id="89" name="Title 1"/>
-          <p:cNvSpPr>
-            <a:spLocks noGrp="1"/>
-          </p:cNvSpPr>
-          <p:nvPr>
-            <p:ph type="title"/>
-          </p:nvPr>
-        </p:nvSpPr>
-        <p:spPr>
-          <a:xfrm>
-            <a:off x="482367" y="283027"/>
-            <a:ext cx="8229600" cy="867347"/>
-          </a:xfrm>
-        </p:spPr>
-        <p:txBody>
-          <a:bodyPr/>
-          <a:lstStyle/>
-          <a:p>
-            <a:r>
-              <a:rPr lang="en-US" dirty="0" smtClean="0"/>
-              <a:t>Demo Architecture</a:t>
-            </a:r>
-            <a:endParaRPr lang="en-US" dirty="0"/>
-          </a:p>
-        </p:txBody>
-      </p:sp>
-      <p:sp>
-        <p:nvSpPr>
-          <p:cNvPr id="90" name="Rectangle 89"/>
-          <p:cNvSpPr/>
-          <p:nvPr/>
-        </p:nvSpPr>
-        <p:spPr>
-          <a:xfrm>
-            <a:off x="3881834" y="2775200"/>
-            <a:ext cx="1295400" cy="1981200"/>
-          </a:xfrm>
-          <a:prstGeom prst="rect">
-            <a:avLst/>
-          </a:prstGeom>
-          <a:solidFill>
-            <a:schemeClr val="bg1"/>
-          </a:solidFill>
-        </p:spPr>
-        <p:style>
-          <a:lnRef idx="2">
-            <a:schemeClr val="accent1">
-              <a:shade val="50000"/>
-            </a:schemeClr>
-          </a:lnRef>
-          <a:fillRef idx="1">
-            <a:schemeClr val="accent1"/>
-          </a:fillRef>
-          <a:effectRef idx="0">
-            <a:schemeClr val="accent1"/>
-          </a:effectRef>
-          <a:fontRef idx="minor">
-            <a:schemeClr val="lt1"/>
-          </a:fontRef>
-        </p:style>
-        <p:txBody>
-          <a:bodyPr rtlCol="0" anchor="ctr"/>
-          <a:lstStyle/>
-          <a:p>
-            <a:pPr algn="ctr"/>
-            <a:endParaRPr lang="en-US" dirty="0"/>
-          </a:p>
-        </p:txBody>
-      </p:sp>
-      <p:sp>
-        <p:nvSpPr>
-          <p:cNvPr id="91" name="TextBox 90"/>
-          <p:cNvSpPr txBox="1"/>
-          <p:nvPr/>
-        </p:nvSpPr>
-        <p:spPr>
-          <a:xfrm>
-            <a:off x="3851360" y="2438236"/>
-            <a:ext cx="1221809" cy="369332"/>
-          </a:xfrm>
-          <a:prstGeom prst="rect">
-            <a:avLst/>
-          </a:prstGeom>
-          <a:noFill/>
-        </p:spPr>
-        <p:txBody>
-          <a:bodyPr wrap="none" rtlCol="0">
-            <a:spAutoFit/>
-          </a:bodyPr>
-          <a:lstStyle/>
-          <a:p>
-            <a:r>
-              <a:rPr lang="en-US" dirty="0" smtClean="0"/>
-              <a:t>k8s-minion</a:t>
-            </a:r>
-            <a:endParaRPr lang="en-US" dirty="0"/>
-          </a:p>
-        </p:txBody>
-      </p:sp>
-      <p:sp>
-        <p:nvSpPr>
-          <p:cNvPr id="92" name="TextBox 91"/>
-          <p:cNvSpPr txBox="1"/>
-          <p:nvPr/>
-        </p:nvSpPr>
-        <p:spPr>
-          <a:xfrm>
-            <a:off x="4013974" y="2192598"/>
-            <a:ext cx="1964449" cy="369332"/>
-          </a:xfrm>
-          <a:prstGeom prst="rect">
-            <a:avLst/>
-          </a:prstGeom>
-          <a:noFill/>
-        </p:spPr>
-        <p:txBody>
-          <a:bodyPr wrap="none" rtlCol="0">
-            <a:spAutoFit/>
-          </a:bodyPr>
-          <a:lstStyle/>
-          <a:p>
-            <a:r>
-              <a:rPr lang="en-US" dirty="0" smtClean="0"/>
-              <a:t>Kubernetes Cluster</a:t>
-            </a:r>
-            <a:endParaRPr lang="en-US" dirty="0"/>
-          </a:p>
-        </p:txBody>
-      </p:sp>
-      <p:sp>
-        <p:nvSpPr>
-          <p:cNvPr id="93" name="TextBox 92"/>
-          <p:cNvSpPr txBox="1"/>
-          <p:nvPr/>
-        </p:nvSpPr>
-        <p:spPr>
-          <a:xfrm>
-            <a:off x="5492024" y="3517144"/>
-            <a:ext cx="415498" cy="369332"/>
-          </a:xfrm>
-          <a:prstGeom prst="rect">
-            <a:avLst/>
-          </a:prstGeom>
-          <a:noFill/>
-        </p:spPr>
-        <p:txBody>
-          <a:bodyPr wrap="none" rtlCol="0">
-            <a:spAutoFit/>
-          </a:bodyPr>
-          <a:lstStyle/>
-          <a:p>
-            <a:r>
-              <a:rPr lang="en-US" dirty="0" smtClean="0"/>
-              <a:t>…</a:t>
-            </a:r>
-            <a:endParaRPr lang="en-US" dirty="0"/>
-          </a:p>
-        </p:txBody>
-      </p:sp>
-      <p:sp>
-        <p:nvSpPr>
-          <p:cNvPr id="97" name="TextBox 96"/>
-          <p:cNvSpPr txBox="1"/>
-          <p:nvPr/>
-        </p:nvSpPr>
-        <p:spPr>
-          <a:xfrm>
-            <a:off x="332605" y="1791324"/>
+            <a:off x="332605" y="1883177"/>
             <a:ext cx="1021370" cy="369332"/>
           </a:xfrm>
           <a:prstGeom prst="rect">
@@ -5238,28 +4916,28 @@
       </p:sp>
       <p:grpSp>
         <p:nvGrpSpPr>
-          <p:cNvPr id="101" name="Group 100"/>
+          <p:cNvPr id="38" name="Group 37"/>
           <p:cNvGrpSpPr/>
           <p:nvPr/>
         </p:nvGrpSpPr>
         <p:grpSpPr>
           <a:xfrm>
-            <a:off x="2216252" y="1610446"/>
-            <a:ext cx="5519733" cy="512402"/>
-            <a:chOff x="3171039" y="2734138"/>
-            <a:chExt cx="2541864" cy="512402"/>
+            <a:off x="2195051" y="2550397"/>
+            <a:ext cx="5561704" cy="2419478"/>
+            <a:chOff x="2195051" y="2879340"/>
+            <a:chExt cx="5561704" cy="2419478"/>
           </a:xfrm>
         </p:grpSpPr>
         <p:sp>
           <p:nvSpPr>
-            <p:cNvPr id="102" name="Rectangle 101"/>
+            <p:cNvPr id="39" name="Rectangle 38"/>
             <p:cNvSpPr/>
             <p:nvPr/>
           </p:nvSpPr>
           <p:spPr>
             <a:xfrm>
-              <a:off x="3171039" y="2734138"/>
-              <a:ext cx="2541864" cy="512402"/>
+              <a:off x="2195051" y="2879340"/>
+              <a:ext cx="5561704" cy="2419478"/>
             </a:xfrm>
             <a:prstGeom prst="rect">
               <a:avLst/>
@@ -5295,175 +4973,20 @@
         </p:sp>
         <p:sp>
           <p:nvSpPr>
-            <p:cNvPr id="103" name="TextBox 102"/>
-            <p:cNvSpPr txBox="1"/>
-            <p:nvPr/>
-          </p:nvSpPr>
-          <p:spPr>
-            <a:xfrm>
-              <a:off x="3958283" y="2805959"/>
-              <a:ext cx="893816" cy="369332"/>
-            </a:xfrm>
-            <a:prstGeom prst="rect">
-              <a:avLst/>
-            </a:prstGeom>
-            <a:noFill/>
-          </p:spPr>
-          <p:txBody>
-            <a:bodyPr wrap="square" rtlCol="0">
-              <a:spAutoFit/>
-            </a:bodyPr>
-            <a:lstStyle/>
-            <a:p>
-              <a:r>
-                <a:rPr lang="en-US" dirty="0" smtClean="0"/>
-                <a:t>EC2 Load Balancer</a:t>
-              </a:r>
-              <a:endParaRPr lang="en-US" dirty="0"/>
-            </a:p>
-          </p:txBody>
-        </p:sp>
-      </p:grpSp>
-      <p:sp>
-        <p:nvSpPr>
-          <p:cNvPr id="104" name="Rectangle 103"/>
-          <p:cNvSpPr/>
-          <p:nvPr/>
-        </p:nvSpPr>
-        <p:spPr>
-          <a:xfrm>
-            <a:off x="3942824" y="2879268"/>
-            <a:ext cx="1191237" cy="402672"/>
-          </a:xfrm>
-          <a:prstGeom prst="rect">
-            <a:avLst/>
-          </a:prstGeom>
-          <a:solidFill>
-            <a:srgbClr val="FFC000"/>
-          </a:solidFill>
-        </p:spPr>
-        <p:style>
-          <a:lnRef idx="2">
-            <a:schemeClr val="accent1">
-              <a:shade val="50000"/>
-            </a:schemeClr>
-          </a:lnRef>
-          <a:fillRef idx="1">
-            <a:schemeClr val="accent1"/>
-          </a:fillRef>
-          <a:effectRef idx="0">
-            <a:schemeClr val="accent1"/>
-          </a:effectRef>
-          <a:fontRef idx="minor">
-            <a:schemeClr val="lt1"/>
-          </a:fontRef>
-        </p:style>
-        <p:txBody>
-          <a:bodyPr rtlCol="0" anchor="ctr"/>
-          <a:lstStyle/>
-          <a:p>
-            <a:pPr algn="ctr"/>
-            <a:r>
-              <a:rPr lang="en-US" sz="1200" dirty="0" smtClean="0">
-                <a:solidFill>
-                  <a:schemeClr val="tx1"/>
-                </a:solidFill>
-              </a:rPr>
-              <a:t>php-apache</a:t>
-            </a:r>
-            <a:endParaRPr lang="en-US" sz="1200" dirty="0">
-              <a:solidFill>
-                <a:schemeClr val="tx1"/>
-              </a:solidFill>
-            </a:endParaRPr>
-          </a:p>
-        </p:txBody>
-      </p:sp>
-      <p:sp>
-        <p:nvSpPr>
-          <p:cNvPr id="105" name="Rectangle 104"/>
-          <p:cNvSpPr/>
-          <p:nvPr/>
-        </p:nvSpPr>
-        <p:spPr>
-          <a:xfrm>
-            <a:off x="6286149" y="2890453"/>
-            <a:ext cx="1191237" cy="402672"/>
-          </a:xfrm>
-          <a:prstGeom prst="rect">
-            <a:avLst/>
-          </a:prstGeom>
-          <a:solidFill>
-            <a:srgbClr val="FFC000"/>
-          </a:solidFill>
-        </p:spPr>
-        <p:style>
-          <a:lnRef idx="2">
-            <a:schemeClr val="accent1">
-              <a:shade val="50000"/>
-            </a:schemeClr>
-          </a:lnRef>
-          <a:fillRef idx="1">
-            <a:schemeClr val="accent1"/>
-          </a:fillRef>
-          <a:effectRef idx="0">
-            <a:schemeClr val="accent1"/>
-          </a:effectRef>
-          <a:fontRef idx="minor">
-            <a:schemeClr val="lt1"/>
-          </a:fontRef>
-        </p:style>
-        <p:txBody>
-          <a:bodyPr rtlCol="0" anchor="ctr"/>
-          <a:lstStyle/>
-          <a:p>
-            <a:pPr algn="ctr"/>
-            <a:r>
-              <a:rPr lang="en-US" sz="1200" dirty="0" smtClean="0">
-                <a:solidFill>
-                  <a:schemeClr val="tx1"/>
-                </a:solidFill>
-              </a:rPr>
-              <a:t>php-apache</a:t>
-            </a:r>
-            <a:endParaRPr lang="en-US" sz="1200" dirty="0">
-              <a:solidFill>
-                <a:schemeClr val="tx1"/>
-              </a:solidFill>
-            </a:endParaRPr>
-          </a:p>
-        </p:txBody>
-      </p:sp>
-      <p:grpSp>
-        <p:nvGrpSpPr>
-          <p:cNvPr id="106" name="Group 105"/>
-          <p:cNvGrpSpPr/>
-          <p:nvPr/>
-        </p:nvGrpSpPr>
-        <p:grpSpPr>
-          <a:xfrm rot="5400000">
-            <a:off x="6692930" y="3234753"/>
-            <a:ext cx="2698363" cy="512402"/>
-            <a:chOff x="2604599" y="1779282"/>
-            <a:chExt cx="2541864" cy="512402"/>
-          </a:xfrm>
-        </p:grpSpPr>
-        <p:sp>
-          <p:nvSpPr>
-            <p:cNvPr id="107" name="Rectangle 106"/>
+            <p:cNvPr id="40" name="Rectangle 39"/>
             <p:cNvSpPr/>
             <p:nvPr/>
           </p:nvSpPr>
           <p:spPr>
             <a:xfrm>
-              <a:off x="2604599" y="1779282"/>
-              <a:ext cx="2541864" cy="512402"/>
+              <a:off x="2501465" y="3463386"/>
+              <a:ext cx="1161759" cy="1671309"/>
             </a:xfrm>
             <a:prstGeom prst="rect">
               <a:avLst/>
             </a:prstGeom>
             <a:solidFill>
-              <a:schemeClr val="bg2"/>
+              <a:schemeClr val="bg1"/>
             </a:solidFill>
           </p:spPr>
           <p:style>
@@ -5493,14 +5016,14 @@
         </p:sp>
         <p:sp>
           <p:nvSpPr>
-            <p:cNvPr id="108" name="TextBox 107"/>
+            <p:cNvPr id="41" name="TextBox 40"/>
             <p:cNvSpPr txBox="1"/>
             <p:nvPr/>
           </p:nvSpPr>
           <p:spPr>
             <a:xfrm>
-              <a:off x="2989233" y="1875380"/>
-              <a:ext cx="1745602" cy="369332"/>
+              <a:off x="2667271" y="3126422"/>
+              <a:ext cx="836832" cy="369332"/>
             </a:xfrm>
             <a:prstGeom prst="rect">
               <a:avLst/>
@@ -5508,30 +5031,350 @@
             <a:noFill/>
           </p:spPr>
           <p:txBody>
-            <a:bodyPr wrap="square" rtlCol="0">
+            <a:bodyPr wrap="none" rtlCol="0">
               <a:spAutoFit/>
             </a:bodyPr>
             <a:lstStyle/>
             <a:p>
               <a:r>
                 <a:rPr lang="en-US" dirty="0" smtClean="0"/>
-                <a:t>EC2 Auto Scaling</a:t>
+                <a:t>master</a:t>
               </a:r>
               <a:endParaRPr lang="en-US" dirty="0"/>
             </a:p>
           </p:txBody>
         </p:sp>
+        <p:sp>
+          <p:nvSpPr>
+            <p:cNvPr id="42" name="Rectangle 41"/>
+            <p:cNvSpPr/>
+            <p:nvPr/>
+          </p:nvSpPr>
+          <p:spPr>
+            <a:xfrm>
+              <a:off x="6228314" y="3463386"/>
+              <a:ext cx="1295400" cy="1671309"/>
+            </a:xfrm>
+            <a:prstGeom prst="rect">
+              <a:avLst/>
+            </a:prstGeom>
+            <a:solidFill>
+              <a:schemeClr val="bg1"/>
+            </a:solidFill>
+          </p:spPr>
+          <p:style>
+            <a:lnRef idx="2">
+              <a:schemeClr val="accent1">
+                <a:shade val="50000"/>
+              </a:schemeClr>
+            </a:lnRef>
+            <a:fillRef idx="1">
+              <a:schemeClr val="accent1"/>
+            </a:fillRef>
+            <a:effectRef idx="0">
+              <a:schemeClr val="accent1"/>
+            </a:effectRef>
+            <a:fontRef idx="minor">
+              <a:schemeClr val="lt1"/>
+            </a:fontRef>
+          </p:style>
+          <p:txBody>
+            <a:bodyPr rtlCol="0" anchor="ctr"/>
+            <a:lstStyle/>
+            <a:p>
+              <a:pPr algn="ctr"/>
+              <a:endParaRPr lang="en-US" dirty="0"/>
+            </a:p>
+          </p:txBody>
+        </p:sp>
+        <p:sp>
+          <p:nvSpPr>
+            <p:cNvPr id="43" name="TextBox 42"/>
+            <p:cNvSpPr txBox="1"/>
+            <p:nvPr/>
+          </p:nvSpPr>
+          <p:spPr>
+            <a:xfrm>
+              <a:off x="6486209" y="3126422"/>
+              <a:ext cx="665567" cy="369332"/>
+            </a:xfrm>
+            <a:prstGeom prst="rect">
+              <a:avLst/>
+            </a:prstGeom>
+            <a:noFill/>
+          </p:spPr>
+          <p:txBody>
+            <a:bodyPr wrap="none" rtlCol="0">
+              <a:spAutoFit/>
+            </a:bodyPr>
+            <a:lstStyle/>
+            <a:p>
+              <a:r>
+                <a:rPr lang="en-US" dirty="0" smtClean="0"/>
+                <a:t>node</a:t>
+              </a:r>
+              <a:endParaRPr lang="en-US" dirty="0"/>
+            </a:p>
+          </p:txBody>
+        </p:sp>
+        <p:sp>
+          <p:nvSpPr>
+            <p:cNvPr id="44" name="Rectangle 43"/>
+            <p:cNvSpPr/>
+            <p:nvPr/>
+          </p:nvSpPr>
+          <p:spPr>
+            <a:xfrm>
+              <a:off x="3881834" y="3485151"/>
+              <a:ext cx="1295400" cy="1649544"/>
+            </a:xfrm>
+            <a:prstGeom prst="rect">
+              <a:avLst/>
+            </a:prstGeom>
+            <a:solidFill>
+              <a:schemeClr val="bg1"/>
+            </a:solidFill>
+          </p:spPr>
+          <p:style>
+            <a:lnRef idx="2">
+              <a:schemeClr val="accent1">
+                <a:shade val="50000"/>
+              </a:schemeClr>
+            </a:lnRef>
+            <a:fillRef idx="1">
+              <a:schemeClr val="accent1"/>
+            </a:fillRef>
+            <a:effectRef idx="0">
+              <a:schemeClr val="accent1"/>
+            </a:effectRef>
+            <a:fontRef idx="minor">
+              <a:schemeClr val="lt1"/>
+            </a:fontRef>
+          </p:style>
+          <p:txBody>
+            <a:bodyPr rtlCol="0" anchor="ctr"/>
+            <a:lstStyle/>
+            <a:p>
+              <a:pPr algn="ctr"/>
+              <a:endParaRPr lang="en-US" dirty="0"/>
+            </a:p>
+          </p:txBody>
+        </p:sp>
+        <p:sp>
+          <p:nvSpPr>
+            <p:cNvPr id="45" name="TextBox 44"/>
+            <p:cNvSpPr txBox="1"/>
+            <p:nvPr/>
+          </p:nvSpPr>
+          <p:spPr>
+            <a:xfrm>
+              <a:off x="4203035" y="3148187"/>
+              <a:ext cx="665567" cy="369332"/>
+            </a:xfrm>
+            <a:prstGeom prst="rect">
+              <a:avLst/>
+            </a:prstGeom>
+            <a:noFill/>
+          </p:spPr>
+          <p:txBody>
+            <a:bodyPr wrap="none" rtlCol="0">
+              <a:spAutoFit/>
+            </a:bodyPr>
+            <a:lstStyle/>
+            <a:p>
+              <a:r>
+                <a:rPr lang="en-US" dirty="0" smtClean="0"/>
+                <a:t>node</a:t>
+              </a:r>
+              <a:endParaRPr lang="en-US" dirty="0"/>
+            </a:p>
+          </p:txBody>
+        </p:sp>
+        <p:sp>
+          <p:nvSpPr>
+            <p:cNvPr id="46" name="TextBox 45"/>
+            <p:cNvSpPr txBox="1"/>
+            <p:nvPr/>
+          </p:nvSpPr>
+          <p:spPr>
+            <a:xfrm>
+              <a:off x="4013974" y="2902549"/>
+              <a:ext cx="1964449" cy="369332"/>
+            </a:xfrm>
+            <a:prstGeom prst="rect">
+              <a:avLst/>
+            </a:prstGeom>
+            <a:noFill/>
+          </p:spPr>
+          <p:txBody>
+            <a:bodyPr wrap="none" rtlCol="0">
+              <a:spAutoFit/>
+            </a:bodyPr>
+            <a:lstStyle/>
+            <a:p>
+              <a:r>
+                <a:rPr lang="en-US" dirty="0" smtClean="0"/>
+                <a:t>Kubernetes Cluster</a:t>
+              </a:r>
+              <a:endParaRPr lang="en-US" dirty="0"/>
+            </a:p>
+          </p:txBody>
+        </p:sp>
+        <p:sp>
+          <p:nvSpPr>
+            <p:cNvPr id="47" name="TextBox 46"/>
+            <p:cNvSpPr txBox="1"/>
+            <p:nvPr/>
+          </p:nvSpPr>
+          <p:spPr>
+            <a:xfrm>
+              <a:off x="5492024" y="4227095"/>
+              <a:ext cx="415498" cy="369332"/>
+            </a:xfrm>
+            <a:prstGeom prst="rect">
+              <a:avLst/>
+            </a:prstGeom>
+            <a:noFill/>
+          </p:spPr>
+          <p:txBody>
+            <a:bodyPr wrap="none" rtlCol="0">
+              <a:spAutoFit/>
+            </a:bodyPr>
+            <a:lstStyle/>
+            <a:p>
+              <a:r>
+                <a:rPr lang="en-US" dirty="0" smtClean="0"/>
+                <a:t>…</a:t>
+              </a:r>
+              <a:endParaRPr lang="en-US" dirty="0"/>
+            </a:p>
+          </p:txBody>
+        </p:sp>
+        <p:sp>
+          <p:nvSpPr>
+            <p:cNvPr id="48" name="Rectangle 47"/>
+            <p:cNvSpPr/>
+            <p:nvPr/>
+          </p:nvSpPr>
+          <p:spPr>
+            <a:xfrm>
+              <a:off x="3942824" y="3589219"/>
+              <a:ext cx="1191237" cy="499860"/>
+            </a:xfrm>
+            <a:prstGeom prst="rect">
+              <a:avLst/>
+            </a:prstGeom>
+            <a:solidFill>
+              <a:srgbClr val="FFC000"/>
+            </a:solidFill>
+          </p:spPr>
+          <p:style>
+            <a:lnRef idx="2">
+              <a:schemeClr val="accent1">
+                <a:shade val="50000"/>
+              </a:schemeClr>
+            </a:lnRef>
+            <a:fillRef idx="1">
+              <a:schemeClr val="accent1"/>
+            </a:fillRef>
+            <a:effectRef idx="0">
+              <a:schemeClr val="accent1"/>
+            </a:effectRef>
+            <a:fontRef idx="minor">
+              <a:schemeClr val="lt1"/>
+            </a:fontRef>
+          </p:style>
+          <p:txBody>
+            <a:bodyPr rtlCol="0" anchor="ctr"/>
+            <a:lstStyle/>
+            <a:p>
+              <a:pPr algn="ctr">
+                <a:lnSpc>
+                  <a:spcPts val="1920"/>
+                </a:lnSpc>
+              </a:pPr>
+              <a:r>
+                <a:rPr lang="en-US" sz="1600" dirty="0">
+                  <a:solidFill>
+                    <a:schemeClr val="tx1"/>
+                  </a:solidFill>
+                </a:rPr>
+                <a:t>load-generator</a:t>
+              </a:r>
+              <a:endParaRPr lang="en-US" sz="1600" dirty="0">
+                <a:solidFill>
+                  <a:schemeClr val="tx1"/>
+                </a:solidFill>
+              </a:endParaRPr>
+            </a:p>
+          </p:txBody>
+        </p:sp>
+        <p:sp>
+          <p:nvSpPr>
+            <p:cNvPr id="49" name="Rectangle 48"/>
+            <p:cNvSpPr/>
+            <p:nvPr/>
+          </p:nvSpPr>
+          <p:spPr>
+            <a:xfrm>
+              <a:off x="6286149" y="3589219"/>
+              <a:ext cx="1191237" cy="499859"/>
+            </a:xfrm>
+            <a:prstGeom prst="rect">
+              <a:avLst/>
+            </a:prstGeom>
+            <a:solidFill>
+              <a:srgbClr val="FFC000"/>
+            </a:solidFill>
+          </p:spPr>
+          <p:style>
+            <a:lnRef idx="2">
+              <a:schemeClr val="accent1">
+                <a:shade val="50000"/>
+              </a:schemeClr>
+            </a:lnRef>
+            <a:fillRef idx="1">
+              <a:schemeClr val="accent1"/>
+            </a:fillRef>
+            <a:effectRef idx="0">
+              <a:schemeClr val="accent1"/>
+            </a:effectRef>
+            <a:fontRef idx="minor">
+              <a:schemeClr val="lt1"/>
+            </a:fontRef>
+          </p:style>
+          <p:txBody>
+            <a:bodyPr rtlCol="0" anchor="ctr"/>
+            <a:lstStyle/>
+            <a:p>
+              <a:pPr algn="ctr"/>
+              <a:r>
+                <a:rPr lang="en-US" sz="1600" dirty="0">
+                  <a:solidFill>
+                    <a:schemeClr val="tx1"/>
+                  </a:solidFill>
+                </a:rPr>
+                <a:t>php-apache</a:t>
+              </a:r>
+              <a:endParaRPr lang="en-US" sz="1600" dirty="0">
+                <a:solidFill>
+                  <a:schemeClr val="tx1"/>
+                </a:solidFill>
+              </a:endParaRPr>
+            </a:p>
+          </p:txBody>
+        </p:sp>
       </p:grpSp>
       <p:sp>
         <p:nvSpPr>
-          <p:cNvPr id="109" name="Rectangle 108"/>
+          <p:cNvPr id="50" name="Rectangle 49"/>
           <p:cNvSpPr/>
           <p:nvPr/>
         </p:nvSpPr>
         <p:spPr>
           <a:xfrm>
-            <a:off x="226576" y="5681708"/>
-            <a:ext cx="8529005" cy="505752"/>
+            <a:off x="226576" y="5773561"/>
+            <a:ext cx="8556697" cy="505752"/>
           </a:xfrm>
           <a:prstGeom prst="rect">
             <a:avLst/>
@@ -5558,19 +5401,19 @@
           <a:lstStyle/>
           <a:p>
             <a:pPr algn="ctr"/>
-            <a:endParaRPr lang="en-US"/>
-          </a:p>
-        </p:txBody>
-      </p:sp>
-      <p:sp>
-        <p:nvSpPr>
-          <p:cNvPr id="110" name="TextBox 109"/>
+            <a:endParaRPr lang="en-US" dirty="0"/>
+          </a:p>
+        </p:txBody>
+      </p:sp>
+      <p:sp>
+        <p:nvSpPr>
+          <p:cNvPr id="51" name="TextBox 50"/>
           <p:cNvSpPr txBox="1"/>
           <p:nvPr/>
         </p:nvSpPr>
         <p:spPr>
           <a:xfrm>
-            <a:off x="315089" y="5779341"/>
+            <a:off x="315089" y="5871194"/>
             <a:ext cx="1404654" cy="369332"/>
           </a:xfrm>
           <a:prstGeom prst="rect">
@@ -5594,13 +5437,309 @@
       </p:sp>
       <p:sp>
         <p:nvSpPr>
-          <p:cNvPr id="111" name="Rectangle 110"/>
+          <p:cNvPr id="52" name="Rectangle 51"/>
           <p:cNvSpPr/>
           <p:nvPr/>
         </p:nvSpPr>
         <p:spPr>
           <a:xfrm>
-            <a:off x="3325504" y="5762627"/>
+            <a:off x="3192104" y="5867117"/>
+            <a:ext cx="2600400" cy="298181"/>
+          </a:xfrm>
+          <a:prstGeom prst="rect">
+            <a:avLst/>
+          </a:prstGeom>
+          <a:solidFill>
+            <a:schemeClr val="bg1"/>
+          </a:solidFill>
+        </p:spPr>
+        <p:style>
+          <a:lnRef idx="2">
+            <a:schemeClr val="accent1">
+              <a:shade val="50000"/>
+            </a:schemeClr>
+          </a:lnRef>
+          <a:fillRef idx="1">
+            <a:schemeClr val="accent1"/>
+          </a:fillRef>
+          <a:effectRef idx="0">
+            <a:schemeClr val="accent1"/>
+          </a:effectRef>
+          <a:fontRef idx="minor">
+            <a:schemeClr val="lt1"/>
+          </a:fontRef>
+        </p:style>
+        <p:txBody>
+          <a:bodyPr rtlCol="0" anchor="ctr"/>
+          <a:lstStyle/>
+          <a:p>
+            <a:r>
+              <a:rPr lang="en-US">
+                <a:solidFill>
+                  <a:schemeClr val="tx1"/>
+                </a:solidFill>
+              </a:rPr>
+              <a:t>Kubernetes </a:t>
+            </a:r>
+            <a:r>
+              <a:rPr lang="en-US" smtClean="0">
+                <a:solidFill>
+                  <a:schemeClr val="tx1"/>
+                </a:solidFill>
+              </a:rPr>
+              <a:t>Cluster </a:t>
+            </a:r>
+            <a:r>
+              <a:rPr lang="en-US" dirty="0" smtClean="0">
+                <a:solidFill>
+                  <a:schemeClr val="tx1"/>
+                </a:solidFill>
+              </a:rPr>
+              <a:t>State</a:t>
+            </a:r>
+            <a:endParaRPr lang="en-US" dirty="0"/>
+          </a:p>
+        </p:txBody>
+      </p:sp>
+      <p:sp>
+        <p:nvSpPr>
+          <p:cNvPr id="53" name="Rectangle 52"/>
+          <p:cNvSpPr/>
+          <p:nvPr/>
+        </p:nvSpPr>
+        <p:spPr>
+          <a:xfrm>
+            <a:off x="2204225" y="5002360"/>
+            <a:ext cx="5573312" cy="672987"/>
+          </a:xfrm>
+          <a:prstGeom prst="rect">
+            <a:avLst/>
+          </a:prstGeom>
+          <a:solidFill>
+            <a:schemeClr val="bg2"/>
+          </a:solidFill>
+        </p:spPr>
+        <p:style>
+          <a:lnRef idx="2">
+            <a:schemeClr val="accent1">
+              <a:shade val="50000"/>
+            </a:schemeClr>
+          </a:lnRef>
+          <a:fillRef idx="1">
+            <a:schemeClr val="accent1"/>
+          </a:fillRef>
+          <a:effectRef idx="0">
+            <a:schemeClr val="accent1"/>
+          </a:effectRef>
+          <a:fontRef idx="minor">
+            <a:schemeClr val="lt1"/>
+          </a:fontRef>
+        </p:style>
+        <p:txBody>
+          <a:bodyPr rtlCol="0" anchor="ctr"/>
+          <a:lstStyle/>
+          <a:p>
+            <a:pPr algn="ctr"/>
+            <a:r>
+              <a:rPr lang="en-US" dirty="0" smtClean="0">
+                <a:solidFill>
+                  <a:schemeClr val="tx1"/>
+                </a:solidFill>
+              </a:rPr>
+              <a:t>EC2 Volumes </a:t>
+            </a:r>
+          </a:p>
+        </p:txBody>
+      </p:sp>
+      <p:sp>
+        <p:nvSpPr>
+          <p:cNvPr id="54" name="Rectangle 53"/>
+          <p:cNvSpPr/>
+          <p:nvPr/>
+        </p:nvSpPr>
+        <p:spPr>
+          <a:xfrm>
+            <a:off x="2530575" y="5055416"/>
+            <a:ext cx="1161759" cy="536015"/>
+          </a:xfrm>
+          <a:prstGeom prst="rect">
+            <a:avLst/>
+          </a:prstGeom>
+          <a:solidFill>
+            <a:schemeClr val="bg1"/>
+          </a:solidFill>
+        </p:spPr>
+        <p:style>
+          <a:lnRef idx="2">
+            <a:schemeClr val="accent1">
+              <a:shade val="50000"/>
+            </a:schemeClr>
+          </a:lnRef>
+          <a:fillRef idx="1">
+            <a:schemeClr val="accent1"/>
+          </a:fillRef>
+          <a:effectRef idx="0">
+            <a:schemeClr val="accent1"/>
+          </a:effectRef>
+          <a:fontRef idx="minor">
+            <a:schemeClr val="lt1"/>
+          </a:fontRef>
+        </p:style>
+        <p:txBody>
+          <a:bodyPr rtlCol="0" anchor="ctr"/>
+          <a:lstStyle/>
+          <a:p>
+            <a:pPr algn="ctr"/>
+            <a:r>
+              <a:rPr lang="en-US" sz="1300" dirty="0" smtClean="0">
+                <a:solidFill>
+                  <a:schemeClr val="tx1"/>
+                </a:solidFill>
+              </a:rPr>
+              <a:t>etcd-main</a:t>
+            </a:r>
+            <a:endParaRPr lang="en-US" sz="1300" dirty="0">
+              <a:solidFill>
+                <a:schemeClr val="tx1"/>
+              </a:solidFill>
+            </a:endParaRPr>
+          </a:p>
+        </p:txBody>
+      </p:sp>
+      <p:sp>
+        <p:nvSpPr>
+          <p:cNvPr id="55" name="Rectangle 54"/>
+          <p:cNvSpPr/>
+          <p:nvPr/>
+        </p:nvSpPr>
+        <p:spPr>
+          <a:xfrm>
+            <a:off x="6282996" y="5058882"/>
+            <a:ext cx="1161759" cy="536015"/>
+          </a:xfrm>
+          <a:prstGeom prst="rect">
+            <a:avLst/>
+          </a:prstGeom>
+          <a:solidFill>
+            <a:schemeClr val="bg1"/>
+          </a:solidFill>
+        </p:spPr>
+        <p:style>
+          <a:lnRef idx="2">
+            <a:schemeClr val="accent1">
+              <a:shade val="50000"/>
+            </a:schemeClr>
+          </a:lnRef>
+          <a:fillRef idx="1">
+            <a:schemeClr val="accent1"/>
+          </a:fillRef>
+          <a:effectRef idx="0">
+            <a:schemeClr val="accent1"/>
+          </a:effectRef>
+          <a:fontRef idx="minor">
+            <a:schemeClr val="lt1"/>
+          </a:fontRef>
+        </p:style>
+        <p:txBody>
+          <a:bodyPr rtlCol="0" anchor="ctr"/>
+          <a:lstStyle/>
+          <a:p>
+            <a:pPr algn="ctr"/>
+            <a:r>
+              <a:rPr lang="en-US" sz="1300" dirty="0" smtClean="0">
+                <a:solidFill>
+                  <a:schemeClr val="tx1"/>
+                </a:solidFill>
+              </a:rPr>
+              <a:t>etcd-events</a:t>
+            </a:r>
+            <a:endParaRPr lang="en-US" sz="1300" dirty="0">
+              <a:solidFill>
+                <a:schemeClr val="tx1"/>
+              </a:solidFill>
+            </a:endParaRPr>
+          </a:p>
+        </p:txBody>
+      </p:sp>
+      <p:sp>
+        <p:nvSpPr>
+          <p:cNvPr id="56" name="Rectangle 55"/>
+          <p:cNvSpPr/>
+          <p:nvPr/>
+        </p:nvSpPr>
+        <p:spPr>
+          <a:xfrm>
+            <a:off x="218458" y="1336098"/>
+            <a:ext cx="8556697" cy="505752"/>
+          </a:xfrm>
+          <a:prstGeom prst="rect">
+            <a:avLst/>
+          </a:prstGeom>
+        </p:spPr>
+        <p:style>
+          <a:lnRef idx="2">
+            <a:schemeClr val="accent1">
+              <a:shade val="50000"/>
+            </a:schemeClr>
+          </a:lnRef>
+          <a:fillRef idx="1">
+            <a:schemeClr val="accent1"/>
+          </a:fillRef>
+          <a:effectRef idx="0">
+            <a:schemeClr val="accent1"/>
+          </a:effectRef>
+          <a:fontRef idx="minor">
+            <a:schemeClr val="lt1"/>
+          </a:fontRef>
+        </p:style>
+        <p:txBody>
+          <a:bodyPr rtlCol="0" anchor="ctr"/>
+          <a:lstStyle/>
+          <a:p>
+            <a:pPr algn="ctr"/>
+            <a:endParaRPr lang="en-US" dirty="0"/>
+          </a:p>
+        </p:txBody>
+      </p:sp>
+      <p:sp>
+        <p:nvSpPr>
+          <p:cNvPr id="57" name="TextBox 56"/>
+          <p:cNvSpPr txBox="1"/>
+          <p:nvPr/>
+        </p:nvSpPr>
+        <p:spPr>
+          <a:xfrm>
+            <a:off x="332605" y="1404308"/>
+            <a:ext cx="1646826" cy="369332"/>
+          </a:xfrm>
+          <a:prstGeom prst="rect">
+            <a:avLst/>
+          </a:prstGeom>
+          <a:noFill/>
+        </p:spPr>
+        <p:txBody>
+          <a:bodyPr wrap="square" rtlCol="0">
+            <a:spAutoFit/>
+          </a:bodyPr>
+          <a:lstStyle/>
+          <a:p>
+            <a:r>
+              <a:rPr lang="en-US" dirty="0" smtClean="0"/>
+              <a:t>AWS Route 53</a:t>
+            </a:r>
+            <a:endParaRPr lang="en-US" dirty="0"/>
+          </a:p>
+        </p:txBody>
+      </p:sp>
+      <p:sp>
+        <p:nvSpPr>
+          <p:cNvPr id="58" name="Rectangle 57"/>
+          <p:cNvSpPr/>
+          <p:nvPr/>
+        </p:nvSpPr>
+        <p:spPr>
+          <a:xfrm>
+            <a:off x="3373407" y="1451424"/>
             <a:ext cx="2282277" cy="323681"/>
           </a:xfrm>
           <a:prstGeom prst="rect">
@@ -5637,169 +5776,9 @@
                   <a:schemeClr val="tx1"/>
                 </a:solidFill>
               </a:rPr>
-              <a:t>kubernetes-staging-*</a:t>
+              <a:t>Subdomain</a:t>
             </a:r>
             <a:endParaRPr lang="en-US" dirty="0">
-              <a:solidFill>
-                <a:schemeClr val="tx1"/>
-              </a:solidFill>
-            </a:endParaRPr>
-          </a:p>
-        </p:txBody>
-      </p:sp>
-      <p:sp>
-        <p:nvSpPr>
-          <p:cNvPr id="112" name="Rectangle 111"/>
-          <p:cNvSpPr/>
-          <p:nvPr/>
-        </p:nvSpPr>
-        <p:spPr>
-          <a:xfrm>
-            <a:off x="2204225" y="4879247"/>
-            <a:ext cx="5573312" cy="672987"/>
-          </a:xfrm>
-          <a:prstGeom prst="rect">
-            <a:avLst/>
-          </a:prstGeom>
-          <a:solidFill>
-            <a:schemeClr val="bg2"/>
-          </a:solidFill>
-        </p:spPr>
-        <p:style>
-          <a:lnRef idx="2">
-            <a:schemeClr val="accent1">
-              <a:shade val="50000"/>
-            </a:schemeClr>
-          </a:lnRef>
-          <a:fillRef idx="1">
-            <a:schemeClr val="accent1"/>
-          </a:fillRef>
-          <a:effectRef idx="0">
-            <a:schemeClr val="accent1"/>
-          </a:effectRef>
-          <a:fontRef idx="minor">
-            <a:schemeClr val="lt1"/>
-          </a:fontRef>
-        </p:style>
-        <p:txBody>
-          <a:bodyPr rtlCol="0" anchor="ctr"/>
-          <a:lstStyle/>
-          <a:p>
-            <a:pPr algn="ctr"/>
-            <a:r>
-              <a:rPr lang="en-US" dirty="0" smtClean="0">
-                <a:solidFill>
-                  <a:schemeClr val="tx1"/>
-                </a:solidFill>
-              </a:rPr>
-              <a:t>EC2 Volumes </a:t>
-            </a:r>
-          </a:p>
-        </p:txBody>
-      </p:sp>
-      <p:sp>
-        <p:nvSpPr>
-          <p:cNvPr id="113" name="Rectangle 112"/>
-          <p:cNvSpPr/>
-          <p:nvPr/>
-        </p:nvSpPr>
-        <p:spPr>
-          <a:xfrm>
-            <a:off x="2530575" y="4940118"/>
-            <a:ext cx="1161759" cy="536015"/>
-          </a:xfrm>
-          <a:prstGeom prst="rect">
-            <a:avLst/>
-          </a:prstGeom>
-          <a:solidFill>
-            <a:schemeClr val="bg1"/>
-          </a:solidFill>
-        </p:spPr>
-        <p:style>
-          <a:lnRef idx="2">
-            <a:schemeClr val="accent1">
-              <a:shade val="50000"/>
-            </a:schemeClr>
-          </a:lnRef>
-          <a:fillRef idx="1">
-            <a:schemeClr val="accent1"/>
-          </a:fillRef>
-          <a:effectRef idx="0">
-            <a:schemeClr val="accent1"/>
-          </a:effectRef>
-          <a:fontRef idx="minor">
-            <a:schemeClr val="lt1"/>
-          </a:fontRef>
-        </p:style>
-        <p:txBody>
-          <a:bodyPr rtlCol="0" anchor="ctr"/>
-          <a:lstStyle/>
-          <a:p>
-            <a:pPr algn="ctr"/>
-            <a:r>
-              <a:rPr lang="en-US" sz="1300" dirty="0" smtClean="0">
-                <a:solidFill>
-                  <a:schemeClr val="tx1"/>
-                </a:solidFill>
-              </a:rPr>
-              <a:t>k8s-master-pd</a:t>
-            </a:r>
-            <a:endParaRPr lang="en-US" sz="1300" dirty="0">
-              <a:solidFill>
-                <a:schemeClr val="tx1"/>
-              </a:solidFill>
-            </a:endParaRPr>
-          </a:p>
-        </p:txBody>
-      </p:sp>
-      <p:sp>
-        <p:nvSpPr>
-          <p:cNvPr id="114" name="Rectangle 113"/>
-          <p:cNvSpPr/>
-          <p:nvPr/>
-        </p:nvSpPr>
-        <p:spPr>
-          <a:xfrm>
-            <a:off x="3937912" y="4299996"/>
-            <a:ext cx="1191237" cy="402672"/>
-          </a:xfrm>
-          <a:prstGeom prst="rect">
-            <a:avLst/>
-          </a:prstGeom>
-          <a:solidFill>
-            <a:srgbClr val="FFC000"/>
-          </a:solidFill>
-        </p:spPr>
-        <p:style>
-          <a:lnRef idx="2">
-            <a:schemeClr val="accent1">
-              <a:shade val="50000"/>
-            </a:schemeClr>
-          </a:lnRef>
-          <a:fillRef idx="1">
-            <a:schemeClr val="accent1"/>
-          </a:fillRef>
-          <a:effectRef idx="0">
-            <a:schemeClr val="accent1"/>
-          </a:effectRef>
-          <a:fontRef idx="minor">
-            <a:schemeClr val="lt1"/>
-          </a:fontRef>
-        </p:style>
-        <p:txBody>
-          <a:bodyPr rtlCol="0" anchor="ctr"/>
-          <a:lstStyle/>
-          <a:p>
-            <a:pPr algn="ctr"/>
-            <a:r>
-              <a:rPr lang="en-US" sz="1200" dirty="0" smtClean="0">
-                <a:solidFill>
-                  <a:schemeClr val="tx1"/>
-                </a:solidFill>
-              </a:rPr>
-              <a:t>load-generator</a:t>
-            </a:r>
-            <a:endParaRPr lang="en-US" sz="1200" dirty="0">
               <a:solidFill>
                 <a:schemeClr val="tx1"/>
               </a:solidFill>
@@ -6012,7 +5991,7 @@
         <p:spPr>
           <a:xfrm>
             <a:off x="1263242" y="1572798"/>
-            <a:ext cx="6705600" cy="4524315"/>
+            <a:ext cx="6705600" cy="3693319"/>
           </a:xfrm>
           <a:prstGeom prst="rect">
             <a:avLst/>
@@ -6032,23 +6011,6 @@
             <a:r>
               <a:rPr lang="en-US" dirty="0" smtClean="0"/>
               <a:t>  There’s two parts to Autoscaling with Kubernetes.  The Pod Autoscaling and Node AutoScaling.</a:t>
-            </a:r>
-          </a:p>
-          <a:p>
-            <a:pPr>
-              <a:buFont typeface="Arial" pitchFamily="34" charset="0"/>
-              <a:buChar char="•"/>
-            </a:pPr>
-            <a:endParaRPr lang="en-US" dirty="0" smtClean="0"/>
-          </a:p>
-          <a:p>
-            <a:pPr>
-              <a:buFont typeface="Arial" pitchFamily="34" charset="0"/>
-              <a:buChar char="•"/>
-            </a:pPr>
-            <a:r>
-              <a:rPr lang="en-US" dirty="0" smtClean="0"/>
-              <a:t>  Node Autoscaling is not supported on AWS for Kubernetes 1.4, but coming soon (Supposedly 1.5)</a:t>
             </a:r>
           </a:p>
           <a:p>
@@ -6181,7 +6143,7 @@
         <p:spPr>
           <a:xfrm>
             <a:off x="605697" y="1562524"/>
-            <a:ext cx="7993773" cy="4247317"/>
+            <a:ext cx="7993773" cy="3693319"/>
           </a:xfrm>
           <a:prstGeom prst="rect">
             <a:avLst/>
@@ -6220,7 +6182,7 @@
             </a:r>
             <a:r>
               <a:rPr lang="en-US" dirty="0" smtClean="0"/>
-              <a:t>--min=1 --max=10</a:t>
+              <a:t>--min=2 --max=10</a:t>
             </a:r>
           </a:p>
           <a:p>
@@ -6242,7 +6204,7 @@
           <a:p>
             <a:r>
               <a:rPr lang="en-US" dirty="0" smtClean="0"/>
-              <a:t>Kube Cluster &gt;= 50 Percent	</a:t>
+              <a:t>Kube Cluster &gt;= 30 Percent	</a:t>
             </a:r>
           </a:p>
           <a:p>
@@ -6252,7 +6214,7 @@
             </a:r>
             <a:r>
               <a:rPr lang="en-US" b="1" dirty="0" smtClean="0"/>
-              <a:t>CPUUtilization &gt;= 50</a:t>
+              <a:t>CPUUtilization &gt;= 30</a:t>
             </a:r>
             <a:r>
               <a:rPr lang="en-US" dirty="0" smtClean="0"/>
@@ -6262,7 +6224,7 @@
           <a:p>
             <a:r>
               <a:rPr lang="en-US" dirty="0" smtClean="0"/>
-              <a:t>Take the action: Add 1 instances when 50 &lt;= CPUUtilization &lt; +infinity</a:t>
+              <a:t>Take the action: Add 1 instances</a:t>
             </a:r>
           </a:p>
           <a:p>
@@ -6283,18 +6245,8 @@
           <a:p>
             <a:r>
               <a:rPr lang="en-US" dirty="0" smtClean="0"/>
-              <a:t>Take the action: Remove 1 instances when 10 &gt;= CPUUtilization &gt; -infinity</a:t>
-            </a:r>
-          </a:p>
-          <a:p>
-            <a:endParaRPr lang="en-US" dirty="0" smtClean="0"/>
-          </a:p>
-          <a:p>
-            <a:pPr>
-              <a:buFont typeface="Arial" pitchFamily="34" charset="0"/>
-              <a:buChar char="•"/>
-            </a:pPr>
-            <a:endParaRPr lang="en-US" dirty="0" smtClean="0"/>
+              <a:t>Take the action: Remove 1 instances</a:t>
+            </a:r>
           </a:p>
         </p:txBody>
       </p:sp>
@@ -6372,34 +6324,32 @@
       </p:pic>
       <p:pic>
         <p:nvPicPr>
-          <p:cNvPr id="3" name="Picture 4"/>
+          <p:cNvPr id="4" name="Picture 3"/>
           <p:cNvPicPr>
-            <a:picLocks noChangeAspect="1" noChangeArrowheads="1"/>
+            <a:picLocks noChangeAspect="1"/>
           </p:cNvPicPr>
           <p:nvPr/>
         </p:nvPicPr>
         <p:blipFill>
-          <a:blip r:embed="rId3" cstate="print"/>
-          <a:srcRect/>
+          <a:blip r:embed="rId3">
+            <a:extLst>
+              <a:ext uri="{28A0092B-C50C-407E-A947-70E740481C1C}">
+                <a14:useLocalDpi xmlns:a14="http://schemas.microsoft.com/office/drawing/2010/main" val="0"/>
+              </a:ext>
+            </a:extLst>
+          </a:blip>
           <a:stretch>
             <a:fillRect/>
           </a:stretch>
         </p:blipFill>
-        <p:spPr bwMode="auto">
+        <p:spPr>
           <a:xfrm>
-            <a:off x="403013" y="1481676"/>
-            <a:ext cx="8503920" cy="4547235"/>
+            <a:off x="108069" y="1423511"/>
+            <a:ext cx="8940582" cy="5303520"/>
           </a:xfrm>
           <a:prstGeom prst="rect">
             <a:avLst/>
           </a:prstGeom>
-          <a:noFill/>
-          <a:ln w="9525">
-            <a:noFill/>
-            <a:miter lim="800000"/>
-            <a:headEnd/>
-            <a:tailEnd/>
-          </a:ln>
         </p:spPr>
       </p:pic>
     </p:spTree>

</xml_diff>